<commit_message>
Update Presentation for Auditors.pptx
</commit_message>
<xml_diff>
--- a/slides/Presentation for Auditors.pptx
+++ b/slides/Presentation for Auditors.pptx
@@ -11,11 +11,14 @@
     <p:sldId id="264" r:id="rId5"/>
     <p:sldId id="266" r:id="rId6"/>
     <p:sldId id="267" r:id="rId7"/>
-    <p:sldId id="263" r:id="rId8"/>
-    <p:sldId id="262" r:id="rId9"/>
-    <p:sldId id="258" r:id="rId10"/>
-    <p:sldId id="259" r:id="rId11"/>
-    <p:sldId id="260" r:id="rId12"/>
+    <p:sldId id="270" r:id="rId8"/>
+    <p:sldId id="263" r:id="rId9"/>
+    <p:sldId id="262" r:id="rId10"/>
+    <p:sldId id="258" r:id="rId11"/>
+    <p:sldId id="268" r:id="rId12"/>
+    <p:sldId id="269" r:id="rId13"/>
+    <p:sldId id="259" r:id="rId14"/>
+    <p:sldId id="260" r:id="rId15"/>
   </p:sldIdLst>
   <p:sldSz cx="12192000" cy="6858000"/>
   <p:notesSz cx="6858000" cy="9144000"/>
@@ -125,9 +128,12 @@
             <p14:sldId id="264"/>
             <p14:sldId id="266"/>
             <p14:sldId id="267"/>
+            <p14:sldId id="270"/>
             <p14:sldId id="263"/>
             <p14:sldId id="262"/>
             <p14:sldId id="258"/>
+            <p14:sldId id="268"/>
+            <p14:sldId id="269"/>
           </p14:sldIdLst>
         </p14:section>
         <p14:section name="Work in progress slides" id="{9A69C85F-1E3D-4567-A245-B358795D5B2C}">
@@ -7715,6 +7721,510 @@
       </p:grpSpPr>
       <p:sp>
         <p:nvSpPr>
+          <p:cNvPr id="10" name="Rectangle 9">
+            <a:extLst>
+              <a:ext uri="{FF2B5EF4-FFF2-40B4-BE49-F238E27FC236}">
+                <a16:creationId xmlns:a16="http://schemas.microsoft.com/office/drawing/2014/main" id="{6753252F-4873-4F63-801D-CC719279A7D5}"/>
+              </a:ext>
+              <a:ext uri="{C183D7F6-B498-43B3-948B-1728B52AA6E4}">
+                <adec:decorative xmlns:adec="http://schemas.microsoft.com/office/drawing/2017/decorative" val="1"/>
+              </a:ext>
+            </a:extLst>
+          </p:cNvPr>
+          <p:cNvSpPr>
+            <a:spLocks noGrp="1" noRot="1" noChangeAspect="1" noMove="1" noResize="1" noEditPoints="1" noAdjustHandles="1" noChangeArrowheads="1" noChangeShapeType="1" noTextEdit="1"/>
+          </p:cNvSpPr>
+          <p:nvPr>
+            <p:extLst>
+              <p:ext uri="{386F3935-93C4-4BCD-93E2-E3B085C9AB24}">
+                <p16:designElem xmlns:p16="http://schemas.microsoft.com/office/powerpoint/2015/main" val="1"/>
+              </p:ext>
+            </p:extLst>
+          </p:nvPr>
+        </p:nvSpPr>
+        <p:spPr>
+          <a:xfrm>
+            <a:off x="0" y="0"/>
+            <a:ext cx="12192000" cy="6858000"/>
+          </a:xfrm>
+          <a:prstGeom prst="rect">
+            <a:avLst/>
+          </a:prstGeom>
+          <a:solidFill>
+            <a:srgbClr val="FFFFFF"/>
+          </a:solidFill>
+          <a:ln>
+            <a:noFill/>
+          </a:ln>
+        </p:spPr>
+        <p:style>
+          <a:lnRef idx="2">
+            <a:schemeClr val="accent1">
+              <a:shade val="50000"/>
+            </a:schemeClr>
+          </a:lnRef>
+          <a:fillRef idx="1">
+            <a:schemeClr val="accent1"/>
+          </a:fillRef>
+          <a:effectRef idx="0">
+            <a:schemeClr val="accent1"/>
+          </a:effectRef>
+          <a:fontRef idx="minor">
+            <a:schemeClr val="lt1"/>
+          </a:fontRef>
+        </p:style>
+        <p:txBody>
+          <a:bodyPr rtlCol="0" anchor="ctr"/>
+          <a:lstStyle/>
+          <a:p>
+            <a:pPr algn="ctr"/>
+            <a:endParaRPr lang="en-US"/>
+          </a:p>
+        </p:txBody>
+      </p:sp>
+      <p:sp>
+        <p:nvSpPr>
+          <p:cNvPr id="15" name="Rectangle 11">
+            <a:extLst>
+              <a:ext uri="{FF2B5EF4-FFF2-40B4-BE49-F238E27FC236}">
+                <a16:creationId xmlns:a16="http://schemas.microsoft.com/office/drawing/2014/main" id="{047C8CCB-F95D-4249-92DD-651249D3535A}"/>
+              </a:ext>
+              <a:ext uri="{C183D7F6-B498-43B3-948B-1728B52AA6E4}">
+                <adec:decorative xmlns:adec="http://schemas.microsoft.com/office/drawing/2017/decorative" val="1"/>
+              </a:ext>
+            </a:extLst>
+          </p:cNvPr>
+          <p:cNvSpPr>
+            <a:spLocks noGrp="1" noRot="1" noChangeAspect="1" noMove="1" noResize="1" noEditPoints="1" noAdjustHandles="1" noChangeArrowheads="1" noChangeShapeType="1" noTextEdit="1"/>
+          </p:cNvSpPr>
+          <p:nvPr>
+            <p:extLst>
+              <p:ext uri="{386F3935-93C4-4BCD-93E2-E3B085C9AB24}">
+                <p16:designElem xmlns:p16="http://schemas.microsoft.com/office/powerpoint/2015/main" val="1"/>
+              </p:ext>
+            </p:extLst>
+          </p:nvPr>
+        </p:nvSpPr>
+        <p:spPr>
+          <a:xfrm>
+            <a:off x="0" y="0"/>
+            <a:ext cx="2013557" cy="6858000"/>
+          </a:xfrm>
+          <a:prstGeom prst="rect">
+            <a:avLst/>
+          </a:prstGeom>
+          <a:solidFill>
+            <a:srgbClr val="435D7B"/>
+          </a:solidFill>
+          <a:ln>
+            <a:noFill/>
+          </a:ln>
+        </p:spPr>
+        <p:style>
+          <a:lnRef idx="2">
+            <a:schemeClr val="accent1">
+              <a:shade val="50000"/>
+            </a:schemeClr>
+          </a:lnRef>
+          <a:fillRef idx="1">
+            <a:schemeClr val="accent1"/>
+          </a:fillRef>
+          <a:effectRef idx="0">
+            <a:schemeClr val="accent1"/>
+          </a:effectRef>
+          <a:fontRef idx="minor">
+            <a:schemeClr val="lt1"/>
+          </a:fontRef>
+        </p:style>
+        <p:txBody>
+          <a:bodyPr rtlCol="0" anchor="ctr"/>
+          <a:lstStyle/>
+          <a:p>
+            <a:pPr algn="ctr"/>
+            <a:endParaRPr lang="en-US"/>
+          </a:p>
+        </p:txBody>
+      </p:sp>
+      <p:pic>
+        <p:nvPicPr>
+          <p:cNvPr id="5" name="Picture 4" descr="A close up of a sign&#10;&#10;Description automatically generated">
+            <a:extLst>
+              <a:ext uri="{FF2B5EF4-FFF2-40B4-BE49-F238E27FC236}">
+                <a16:creationId xmlns:a16="http://schemas.microsoft.com/office/drawing/2014/main" id="{F947E86C-78B3-4201-971E-8DBC568110F1}"/>
+              </a:ext>
+            </a:extLst>
+          </p:cNvPr>
+          <p:cNvPicPr>
+            <a:picLocks noChangeAspect="1"/>
+          </p:cNvPicPr>
+          <p:nvPr/>
+        </p:nvPicPr>
+        <p:blipFill>
+          <a:blip r:embed="rId2">
+            <a:extLst>
+              <a:ext uri="{28A0092B-C50C-407E-A947-70E740481C1C}">
+                <a14:useLocalDpi xmlns:a14="http://schemas.microsoft.com/office/drawing/2010/main" val="0"/>
+              </a:ext>
+            </a:extLst>
+          </a:blip>
+          <a:stretch>
+            <a:fillRect/>
+          </a:stretch>
+        </p:blipFill>
+        <p:spPr>
+          <a:xfrm>
+            <a:off x="3058511" y="258862"/>
+            <a:ext cx="7677806" cy="6340275"/>
+          </a:xfrm>
+          <a:prstGeom prst="rect">
+            <a:avLst/>
+          </a:prstGeom>
+        </p:spPr>
+      </p:pic>
+      <p:sp>
+        <p:nvSpPr>
+          <p:cNvPr id="2" name="Title 1">
+            <a:extLst>
+              <a:ext uri="{FF2B5EF4-FFF2-40B4-BE49-F238E27FC236}">
+                <a16:creationId xmlns:a16="http://schemas.microsoft.com/office/drawing/2014/main" id="{9EB47BE4-BD7C-4F3D-B3B2-4C772A90373B}"/>
+              </a:ext>
+            </a:extLst>
+          </p:cNvPr>
+          <p:cNvSpPr>
+            <a:spLocks noGrp="1"/>
+          </p:cNvSpPr>
+          <p:nvPr>
+            <p:ph type="title"/>
+          </p:nvPr>
+        </p:nvSpPr>
+        <p:spPr>
+          <a:xfrm>
+            <a:off x="640080" y="2074363"/>
+            <a:ext cx="2752354" cy="2709275"/>
+          </a:xfrm>
+          <a:prstGeom prst="ellipse">
+            <a:avLst/>
+          </a:prstGeom>
+          <a:solidFill>
+            <a:srgbClr val="262626"/>
+          </a:solidFill>
+          <a:ln w="174625" cmpd="thinThick">
+            <a:solidFill>
+              <a:srgbClr val="262626"/>
+            </a:solidFill>
+          </a:ln>
+        </p:spPr>
+        <p:txBody>
+          <a:bodyPr vert="horz" lIns="91440" tIns="45720" rIns="91440" bIns="45720" rtlCol="0" anchor="ctr">
+            <a:normAutofit/>
+          </a:bodyPr>
+          <a:lstStyle/>
+          <a:p>
+            <a:pPr algn="ctr"/>
+            <a:r>
+              <a:rPr lang="en-US" sz="2600" kern="1200">
+                <a:solidFill>
+                  <a:srgbClr val="FFFFFF"/>
+                </a:solidFill>
+                <a:latin typeface="+mj-lt"/>
+                <a:ea typeface="+mj-ea"/>
+                <a:cs typeface="+mj-cs"/>
+              </a:rPr>
+              <a:t>Scenario based discussion</a:t>
+            </a:r>
+          </a:p>
+        </p:txBody>
+      </p:sp>
+    </p:spTree>
+    <p:extLst>
+      <p:ext uri="{BB962C8B-B14F-4D97-AF65-F5344CB8AC3E}">
+        <p14:creationId xmlns:p14="http://schemas.microsoft.com/office/powerpoint/2010/main" val="2364114090"/>
+      </p:ext>
+    </p:extLst>
+  </p:cSld>
+  <p:clrMapOvr>
+    <a:masterClrMapping/>
+  </p:clrMapOvr>
+</p:sld>
+</file>
+
+<file path=ppt/slides/slide11.xml><?xml version="1.0" encoding="utf-8"?>
+<p:sld xmlns:a="http://schemas.openxmlformats.org/drawingml/2006/main" xmlns:r="http://schemas.openxmlformats.org/officeDocument/2006/relationships" xmlns:p="http://schemas.openxmlformats.org/presentationml/2006/main">
+  <p:cSld>
+    <p:spTree>
+      <p:nvGrpSpPr>
+        <p:cNvPr id="1" name=""/>
+        <p:cNvGrpSpPr/>
+        <p:nvPr/>
+      </p:nvGrpSpPr>
+      <p:grpSpPr>
+        <a:xfrm>
+          <a:off x="0" y="0"/>
+          <a:ext cx="0" cy="0"/>
+          <a:chOff x="0" y="0"/>
+          <a:chExt cx="0" cy="0"/>
+        </a:xfrm>
+      </p:grpSpPr>
+      <p:sp>
+        <p:nvSpPr>
+          <p:cNvPr id="2" name="Title 1">
+            <a:extLst>
+              <a:ext uri="{FF2B5EF4-FFF2-40B4-BE49-F238E27FC236}">
+                <a16:creationId xmlns:a16="http://schemas.microsoft.com/office/drawing/2014/main" id="{2B5CBB85-1AB0-4A2B-8281-35F4860834F9}"/>
+              </a:ext>
+            </a:extLst>
+          </p:cNvPr>
+          <p:cNvSpPr>
+            <a:spLocks noGrp="1"/>
+          </p:cNvSpPr>
+          <p:nvPr>
+            <p:ph type="title"/>
+          </p:nvPr>
+        </p:nvSpPr>
+        <p:spPr/>
+        <p:txBody>
+          <a:bodyPr/>
+          <a:lstStyle/>
+          <a:p>
+            <a:r>
+              <a:rPr lang="en-US" dirty="0"/>
+              <a:t>Resources</a:t>
+            </a:r>
+          </a:p>
+        </p:txBody>
+      </p:sp>
+      <p:sp>
+        <p:nvSpPr>
+          <p:cNvPr id="3" name="Content Placeholder 2">
+            <a:extLst>
+              <a:ext uri="{FF2B5EF4-FFF2-40B4-BE49-F238E27FC236}">
+                <a16:creationId xmlns:a16="http://schemas.microsoft.com/office/drawing/2014/main" id="{BB5EBC91-F5E0-4A53-BF27-72ED1A19B837}"/>
+              </a:ext>
+            </a:extLst>
+          </p:cNvPr>
+          <p:cNvSpPr>
+            <a:spLocks noGrp="1"/>
+          </p:cNvSpPr>
+          <p:nvPr>
+            <p:ph idx="1"/>
+          </p:nvPr>
+        </p:nvSpPr>
+        <p:spPr/>
+        <p:txBody>
+          <a:bodyPr/>
+          <a:lstStyle/>
+          <a:p>
+            <a:r>
+              <a:rPr lang="en-US" dirty="0">
+                <a:hlinkClick r:id="rId2"/>
+              </a:rPr>
+              <a:t>Microsoft Learn</a:t>
+            </a:r>
+            <a:endParaRPr lang="en-US" dirty="0"/>
+          </a:p>
+          <a:p>
+            <a:r>
+              <a:rPr lang="en-US" dirty="0"/>
+              <a:t>AZ-900: Azure Fundamentals</a:t>
+            </a:r>
+          </a:p>
+          <a:p>
+            <a:r>
+              <a:rPr lang="en-US" dirty="0"/>
+              <a:t>DP-200/DP201: Data Engineering and Data Architecture</a:t>
+            </a:r>
+          </a:p>
+          <a:p>
+            <a:r>
+              <a:rPr lang="en-US" dirty="0"/>
+              <a:t>AZ-400: Azure DevOps</a:t>
+            </a:r>
+          </a:p>
+          <a:p>
+            <a:r>
+              <a:rPr lang="en-US" dirty="0"/>
+              <a:t>AI-100: Introduction to Artificial Intelligence and Machine Learning</a:t>
+            </a:r>
+          </a:p>
+          <a:p>
+            <a:r>
+              <a:rPr lang="en-US" dirty="0">
+                <a:hlinkClick r:id="rId3"/>
+              </a:rPr>
+              <a:t>Cloud Skills Challenge Contest</a:t>
+            </a:r>
+            <a:endParaRPr lang="en-US" dirty="0"/>
+          </a:p>
+        </p:txBody>
+      </p:sp>
+    </p:spTree>
+    <p:extLst>
+      <p:ext uri="{BB962C8B-B14F-4D97-AF65-F5344CB8AC3E}">
+        <p14:creationId xmlns:p14="http://schemas.microsoft.com/office/powerpoint/2010/main" val="1508845797"/>
+      </p:ext>
+    </p:extLst>
+  </p:cSld>
+  <p:clrMapOvr>
+    <a:masterClrMapping/>
+  </p:clrMapOvr>
+</p:sld>
+</file>
+
+<file path=ppt/slides/slide12.xml><?xml version="1.0" encoding="utf-8"?>
+<p:sld xmlns:a="http://schemas.openxmlformats.org/drawingml/2006/main" xmlns:r="http://schemas.openxmlformats.org/officeDocument/2006/relationships" xmlns:p="http://schemas.openxmlformats.org/presentationml/2006/main">
+  <p:cSld>
+    <p:spTree>
+      <p:nvGrpSpPr>
+        <p:cNvPr id="1" name=""/>
+        <p:cNvGrpSpPr/>
+        <p:nvPr/>
+      </p:nvGrpSpPr>
+      <p:grpSpPr>
+        <a:xfrm>
+          <a:off x="0" y="0"/>
+          <a:ext cx="0" cy="0"/>
+          <a:chOff x="0" y="0"/>
+          <a:chExt cx="0" cy="0"/>
+        </a:xfrm>
+      </p:grpSpPr>
+      <p:sp>
+        <p:nvSpPr>
+          <p:cNvPr id="2" name="Title 1">
+            <a:extLst>
+              <a:ext uri="{FF2B5EF4-FFF2-40B4-BE49-F238E27FC236}">
+                <a16:creationId xmlns:a16="http://schemas.microsoft.com/office/drawing/2014/main" id="{40E9E3E6-F907-45BB-8551-83F93D10CE59}"/>
+              </a:ext>
+            </a:extLst>
+          </p:cNvPr>
+          <p:cNvSpPr>
+            <a:spLocks noGrp="1"/>
+          </p:cNvSpPr>
+          <p:nvPr>
+            <p:ph type="title"/>
+          </p:nvPr>
+        </p:nvSpPr>
+        <p:spPr/>
+        <p:txBody>
+          <a:bodyPr/>
+          <a:lstStyle/>
+          <a:p>
+            <a:r>
+              <a:rPr lang="en-US" dirty="0"/>
+              <a:t>References</a:t>
+            </a:r>
+          </a:p>
+        </p:txBody>
+      </p:sp>
+      <p:sp>
+        <p:nvSpPr>
+          <p:cNvPr id="3" name="Content Placeholder 2">
+            <a:extLst>
+              <a:ext uri="{FF2B5EF4-FFF2-40B4-BE49-F238E27FC236}">
+                <a16:creationId xmlns:a16="http://schemas.microsoft.com/office/drawing/2014/main" id="{82A008E8-E498-48EF-BA37-8E75081A0FA2}"/>
+              </a:ext>
+            </a:extLst>
+          </p:cNvPr>
+          <p:cNvSpPr>
+            <a:spLocks noGrp="1"/>
+          </p:cNvSpPr>
+          <p:nvPr>
+            <p:ph idx="1"/>
+          </p:nvPr>
+        </p:nvSpPr>
+        <p:spPr/>
+        <p:txBody>
+          <a:bodyPr/>
+          <a:lstStyle/>
+          <a:p>
+            <a:r>
+              <a:rPr lang="en-US" dirty="0">
+                <a:hlinkClick r:id="rId2"/>
+              </a:rPr>
+              <a:t>Real-time fraud detection using </a:t>
+            </a:r>
+            <a:r>
+              <a:rPr lang="en-US" dirty="0" err="1">
+                <a:hlinkClick r:id="rId2"/>
+              </a:rPr>
+              <a:t>CosmosDB</a:t>
+            </a:r>
+            <a:r>
+              <a:rPr lang="en-US" dirty="0">
+                <a:hlinkClick r:id="rId2"/>
+              </a:rPr>
+              <a:t> to analyze streaming data</a:t>
+            </a:r>
+            <a:endParaRPr lang="en-US" dirty="0"/>
+          </a:p>
+          <a:p>
+            <a:r>
+              <a:rPr lang="en-US" dirty="0">
+                <a:hlinkClick r:id="rId3"/>
+              </a:rPr>
+              <a:t>Anomaly Detection using Azure ML Studio</a:t>
+            </a:r>
+            <a:endParaRPr lang="en-US" dirty="0"/>
+          </a:p>
+          <a:p>
+            <a:r>
+              <a:rPr lang="en-US" dirty="0">
+                <a:hlinkClick r:id="rId4"/>
+              </a:rPr>
+              <a:t>Real-time fraud detection on Azure (additional use cases)</a:t>
+            </a:r>
+            <a:endParaRPr lang="en-US" dirty="0"/>
+          </a:p>
+          <a:p>
+            <a:r>
+              <a:rPr lang="en-US" dirty="0">
+                <a:hlinkClick r:id="rId5"/>
+              </a:rPr>
+              <a:t>Introduction to Azure Machine Learning</a:t>
+            </a:r>
+            <a:endParaRPr lang="en-US" dirty="0"/>
+          </a:p>
+        </p:txBody>
+      </p:sp>
+    </p:spTree>
+    <p:extLst>
+      <p:ext uri="{BB962C8B-B14F-4D97-AF65-F5344CB8AC3E}">
+        <p14:creationId xmlns:p14="http://schemas.microsoft.com/office/powerpoint/2010/main" val="3881233414"/>
+      </p:ext>
+    </p:extLst>
+  </p:cSld>
+  <p:clrMapOvr>
+    <a:masterClrMapping/>
+  </p:clrMapOvr>
+</p:sld>
+</file>
+
+<file path=ppt/slides/slide13.xml><?xml version="1.0" encoding="utf-8"?>
+<p:sld xmlns:a="http://schemas.openxmlformats.org/drawingml/2006/main" xmlns:r="http://schemas.openxmlformats.org/officeDocument/2006/relationships" xmlns:p="http://schemas.openxmlformats.org/presentationml/2006/main">
+  <p:cSld>
+    <p:bg>
+      <p:bgPr>
+        <a:solidFill>
+          <a:schemeClr val="bg1"/>
+        </a:solidFill>
+        <a:effectLst/>
+      </p:bgPr>
+    </p:bg>
+    <p:spTree>
+      <p:nvGrpSpPr>
+        <p:cNvPr id="1" name=""/>
+        <p:cNvGrpSpPr/>
+        <p:nvPr/>
+      </p:nvGrpSpPr>
+      <p:grpSpPr>
+        <a:xfrm>
+          <a:off x="0" y="0"/>
+          <a:ext cx="0" cy="0"/>
+          <a:chOff x="0" y="0"/>
+          <a:chExt cx="0" cy="0"/>
+        </a:xfrm>
+      </p:grpSpPr>
+      <p:sp>
+        <p:nvSpPr>
           <p:cNvPr id="2" name="Title 1">
             <a:extLst>
               <a:ext uri="{FF2B5EF4-FFF2-40B4-BE49-F238E27FC236}">
@@ -7792,7 +8302,7 @@
 </p:sld>
 </file>
 
-<file path=ppt/slides/slide11.xml><?xml version="1.0" encoding="utf-8"?>
+<file path=ppt/slides/slide14.xml><?xml version="1.0" encoding="utf-8"?>
 <p:sld xmlns:a="http://schemas.openxmlformats.org/drawingml/2006/main" xmlns:r="http://schemas.openxmlformats.org/officeDocument/2006/relationships" xmlns:p="http://schemas.openxmlformats.org/presentationml/2006/main">
   <p:cSld>
     <p:spTree>
@@ -8686,7 +9196,7 @@
         </p:nvSpPr>
         <p:spPr>
           <a:xfrm>
-            <a:off x="801099" y="1396289"/>
+            <a:off x="606027" y="2603297"/>
             <a:ext cx="5006336" cy="1325563"/>
           </a:xfrm>
         </p:spPr>
@@ -8697,83 +9207,9 @@
           <a:lstStyle/>
           <a:p>
             <a:r>
-              <a:rPr lang="en-US" sz="4400"/>
+              <a:rPr lang="en-US" sz="4400" dirty="0"/>
               <a:t>Characteristics of an audit - Data</a:t>
             </a:r>
-          </a:p>
-        </p:txBody>
-      </p:sp>
-      <p:sp>
-        <p:nvSpPr>
-          <p:cNvPr id="3" name="Content Placeholder 2">
-            <a:extLst>
-              <a:ext uri="{FF2B5EF4-FFF2-40B4-BE49-F238E27FC236}">
-                <a16:creationId xmlns:a16="http://schemas.microsoft.com/office/drawing/2014/main" id="{171144AD-97D3-4090-AF58-BBDC406F5082}"/>
-              </a:ext>
-            </a:extLst>
-          </p:cNvPr>
-          <p:cNvSpPr>
-            <a:spLocks noGrp="1"/>
-          </p:cNvSpPr>
-          <p:nvPr>
-            <p:ph idx="1"/>
-          </p:nvPr>
-        </p:nvSpPr>
-        <p:spPr>
-          <a:xfrm>
-            <a:off x="805543" y="2871982"/>
-            <a:ext cx="5006336" cy="3181684"/>
-          </a:xfrm>
-        </p:spPr>
-        <p:txBody>
-          <a:bodyPr anchor="t">
-            <a:normAutofit/>
-          </a:bodyPr>
-          <a:lstStyle/>
-          <a:p>
-            <a:r>
-              <a:rPr lang="en-US" sz="1800"/>
-              <a:t>Data</a:t>
-            </a:r>
-          </a:p>
-          <a:p>
-            <a:pPr lvl="1"/>
-            <a:r>
-              <a:rPr lang="en-US" sz="1800"/>
-              <a:t>Size</a:t>
-            </a:r>
-          </a:p>
-          <a:p>
-            <a:pPr lvl="1"/>
-            <a:r>
-              <a:rPr lang="en-US" sz="1800"/>
-              <a:t>Cleanliness</a:t>
-            </a:r>
-          </a:p>
-          <a:p>
-            <a:pPr lvl="1"/>
-            <a:r>
-              <a:rPr lang="en-US" sz="1800"/>
-              <a:t>Transfers</a:t>
-            </a:r>
-          </a:p>
-          <a:p>
-            <a:pPr lvl="1"/>
-            <a:r>
-              <a:rPr lang="en-US" sz="1800"/>
-              <a:t>Updates</a:t>
-            </a:r>
-          </a:p>
-          <a:p>
-            <a:pPr lvl="1"/>
-            <a:r>
-              <a:rPr lang="en-US" sz="1800"/>
-              <a:t>Scalability</a:t>
-            </a:r>
-          </a:p>
-          <a:p>
-            <a:pPr lvl="1"/>
-            <a:endParaRPr lang="en-US" sz="1800"/>
           </a:p>
         </p:txBody>
       </p:sp>
@@ -10297,6 +10733,764 @@
     <p:bg>
       <p:bgPr>
         <a:solidFill>
+          <a:schemeClr val="bg1"/>
+        </a:solidFill>
+        <a:effectLst/>
+      </p:bgPr>
+    </p:bg>
+    <p:spTree>
+      <p:nvGrpSpPr>
+        <p:cNvPr id="1" name=""/>
+        <p:cNvGrpSpPr/>
+        <p:nvPr/>
+      </p:nvGrpSpPr>
+      <p:grpSpPr>
+        <a:xfrm>
+          <a:off x="0" y="0"/>
+          <a:ext cx="0" cy="0"/>
+          <a:chOff x="0" y="0"/>
+          <a:chExt cx="0" cy="0"/>
+        </a:xfrm>
+      </p:grpSpPr>
+      <p:pic>
+        <p:nvPicPr>
+          <p:cNvPr id="13" name="Picture 12" descr="A picture containing drawing&#10;&#10;Description automatically generated">
+            <a:extLst>
+              <a:ext uri="{FF2B5EF4-FFF2-40B4-BE49-F238E27FC236}">
+                <a16:creationId xmlns:a16="http://schemas.microsoft.com/office/drawing/2014/main" id="{BD2B3DDF-F271-492B-88A1-0922668A3119}"/>
+              </a:ext>
+            </a:extLst>
+          </p:cNvPr>
+          <p:cNvPicPr>
+            <a:picLocks noChangeAspect="1"/>
+          </p:cNvPicPr>
+          <p:nvPr/>
+        </p:nvPicPr>
+        <p:blipFill>
+          <a:blip r:embed="rId2">
+            <a:extLst>
+              <a:ext uri="{28A0092B-C50C-407E-A947-70E740481C1C}">
+                <a14:useLocalDpi xmlns:a14="http://schemas.microsoft.com/office/drawing/2010/main" val="0"/>
+              </a:ext>
+            </a:extLst>
+          </a:blip>
+          <a:stretch>
+            <a:fillRect/>
+          </a:stretch>
+        </p:blipFill>
+        <p:spPr>
+          <a:xfrm>
+            <a:off x="1237684" y="346167"/>
+            <a:ext cx="1588946" cy="1588946"/>
+          </a:xfrm>
+          <a:prstGeom prst="rect">
+            <a:avLst/>
+          </a:prstGeom>
+        </p:spPr>
+      </p:pic>
+      <p:pic>
+        <p:nvPicPr>
+          <p:cNvPr id="9" name="Picture 8" descr="A close up of text on a black background&#10;&#10;Description automatically generated">
+            <a:extLst>
+              <a:ext uri="{FF2B5EF4-FFF2-40B4-BE49-F238E27FC236}">
+                <a16:creationId xmlns:a16="http://schemas.microsoft.com/office/drawing/2014/main" id="{613662FC-8133-462B-AB02-5A15D66864A2}"/>
+              </a:ext>
+            </a:extLst>
+          </p:cNvPr>
+          <p:cNvPicPr>
+            <a:picLocks noChangeAspect="1"/>
+          </p:cNvPicPr>
+          <p:nvPr/>
+        </p:nvPicPr>
+        <p:blipFill>
+          <a:blip r:embed="rId3">
+            <a:extLst>
+              <a:ext uri="{28A0092B-C50C-407E-A947-70E740481C1C}">
+                <a14:useLocalDpi xmlns:a14="http://schemas.microsoft.com/office/drawing/2010/main" val="0"/>
+              </a:ext>
+            </a:extLst>
+          </a:blip>
+          <a:stretch>
+            <a:fillRect/>
+          </a:stretch>
+        </p:blipFill>
+        <p:spPr>
+          <a:xfrm>
+            <a:off x="4633774" y="346167"/>
+            <a:ext cx="2751900" cy="1547944"/>
+          </a:xfrm>
+          <a:prstGeom prst="rect">
+            <a:avLst/>
+          </a:prstGeom>
+        </p:spPr>
+      </p:pic>
+      <p:pic>
+        <p:nvPicPr>
+          <p:cNvPr id="7" name="Picture 6" descr="A picture containing object, indoor, looking, sitting&#10;&#10;Description automatically generated">
+            <a:extLst>
+              <a:ext uri="{FF2B5EF4-FFF2-40B4-BE49-F238E27FC236}">
+                <a16:creationId xmlns:a16="http://schemas.microsoft.com/office/drawing/2014/main" id="{82963959-DEC8-4191-85B9-860A13B45C9D}"/>
+              </a:ext>
+            </a:extLst>
+          </p:cNvPr>
+          <p:cNvPicPr>
+            <a:picLocks noChangeAspect="1"/>
+          </p:cNvPicPr>
+          <p:nvPr/>
+        </p:nvPicPr>
+        <p:blipFill>
+          <a:blip r:embed="rId4">
+            <a:extLst>
+              <a:ext uri="{28A0092B-C50C-407E-A947-70E740481C1C}">
+                <a14:useLocalDpi xmlns:a14="http://schemas.microsoft.com/office/drawing/2010/main" val="0"/>
+              </a:ext>
+            </a:extLst>
+          </a:blip>
+          <a:stretch>
+            <a:fillRect/>
+          </a:stretch>
+        </p:blipFill>
+        <p:spPr>
+          <a:xfrm>
+            <a:off x="8724901" y="346167"/>
+            <a:ext cx="2751907" cy="1547948"/>
+          </a:xfrm>
+          <a:prstGeom prst="rect">
+            <a:avLst/>
+          </a:prstGeom>
+        </p:spPr>
+      </p:pic>
+      <p:pic>
+        <p:nvPicPr>
+          <p:cNvPr id="11" name="Picture 10" descr="A picture containing text&#10;&#10;Description automatically generated">
+            <a:extLst>
+              <a:ext uri="{FF2B5EF4-FFF2-40B4-BE49-F238E27FC236}">
+                <a16:creationId xmlns:a16="http://schemas.microsoft.com/office/drawing/2014/main" id="{3CA7A38E-601A-45C6-B0CC-73F3FF2F5EE6}"/>
+              </a:ext>
+            </a:extLst>
+          </p:cNvPr>
+          <p:cNvPicPr>
+            <a:picLocks noChangeAspect="1"/>
+          </p:cNvPicPr>
+          <p:nvPr/>
+        </p:nvPicPr>
+        <p:blipFill>
+          <a:blip r:embed="rId5">
+            <a:extLst>
+              <a:ext uri="{28A0092B-C50C-407E-A947-70E740481C1C}">
+                <a14:useLocalDpi xmlns:a14="http://schemas.microsoft.com/office/drawing/2010/main" val="0"/>
+              </a:ext>
+            </a:extLst>
+          </a:blip>
+          <a:stretch>
+            <a:fillRect/>
+          </a:stretch>
+        </p:blipFill>
+        <p:spPr>
+          <a:xfrm>
+            <a:off x="969324" y="2639045"/>
+            <a:ext cx="2125663" cy="1588934"/>
+          </a:xfrm>
+          <a:prstGeom prst="rect">
+            <a:avLst/>
+          </a:prstGeom>
+        </p:spPr>
+      </p:pic>
+      <p:pic>
+        <p:nvPicPr>
+          <p:cNvPr id="5" name="Picture 4" descr="A picture containing refrigerator&#10;&#10;Description automatically generated">
+            <a:extLst>
+              <a:ext uri="{FF2B5EF4-FFF2-40B4-BE49-F238E27FC236}">
+                <a16:creationId xmlns:a16="http://schemas.microsoft.com/office/drawing/2014/main" id="{117BAB31-0AB1-446B-ADEA-B890A7519C2E}"/>
+              </a:ext>
+            </a:extLst>
+          </p:cNvPr>
+          <p:cNvPicPr>
+            <a:picLocks noChangeAspect="1"/>
+          </p:cNvPicPr>
+          <p:nvPr/>
+        </p:nvPicPr>
+        <p:blipFill>
+          <a:blip r:embed="rId6">
+            <a:extLst>
+              <a:ext uri="{28A0092B-C50C-407E-A947-70E740481C1C}">
+                <a14:useLocalDpi xmlns:a14="http://schemas.microsoft.com/office/drawing/2010/main" val="0"/>
+              </a:ext>
+            </a:extLst>
+          </a:blip>
+          <a:stretch>
+            <a:fillRect/>
+          </a:stretch>
+        </p:blipFill>
+        <p:spPr>
+          <a:xfrm>
+            <a:off x="912084" y="4930536"/>
+            <a:ext cx="2236980" cy="1582664"/>
+          </a:xfrm>
+          <a:prstGeom prst="rect">
+            <a:avLst/>
+          </a:prstGeom>
+        </p:spPr>
+      </p:pic>
+      <p:sp>
+        <p:nvSpPr>
+          <p:cNvPr id="18" name="Rectangle 17">
+            <a:extLst>
+              <a:ext uri="{FF2B5EF4-FFF2-40B4-BE49-F238E27FC236}">
+                <a16:creationId xmlns:a16="http://schemas.microsoft.com/office/drawing/2014/main" id="{A5A17FC0-D416-4C8B-A9E6-5924D352B986}"/>
+              </a:ext>
+              <a:ext uri="{C183D7F6-B498-43B3-948B-1728B52AA6E4}">
+                <adec:decorative xmlns:adec="http://schemas.microsoft.com/office/drawing/2017/decorative" val="1"/>
+              </a:ext>
+            </a:extLst>
+          </p:cNvPr>
+          <p:cNvSpPr>
+            <a:spLocks noGrp="1" noRot="1" noChangeAspect="1" noMove="1" noResize="1" noEditPoints="1" noAdjustHandles="1" noChangeArrowheads="1" noChangeShapeType="1" noTextEdit="1"/>
+          </p:cNvSpPr>
+          <p:nvPr>
+            <p:extLst>
+              <p:ext uri="{386F3935-93C4-4BCD-93E2-E3B085C9AB24}">
+                <p16:designElem xmlns:p16="http://schemas.microsoft.com/office/powerpoint/2015/main" val="1"/>
+              </p:ext>
+            </p:extLst>
+          </p:nvPr>
+        </p:nvSpPr>
+        <p:spPr>
+          <a:xfrm>
+            <a:off x="4067495" y="2300641"/>
+            <a:ext cx="8124506" cy="4557360"/>
+          </a:xfrm>
+          <a:prstGeom prst="rect">
+            <a:avLst/>
+          </a:prstGeom>
+          <a:solidFill>
+            <a:srgbClr val="404040"/>
+          </a:solidFill>
+          <a:ln>
+            <a:noFill/>
+          </a:ln>
+        </p:spPr>
+        <p:style>
+          <a:lnRef idx="2">
+            <a:schemeClr val="accent1">
+              <a:shade val="50000"/>
+            </a:schemeClr>
+          </a:lnRef>
+          <a:fillRef idx="1">
+            <a:schemeClr val="accent1"/>
+          </a:fillRef>
+          <a:effectRef idx="0">
+            <a:schemeClr val="accent1"/>
+          </a:effectRef>
+          <a:fontRef idx="minor">
+            <a:schemeClr val="lt1"/>
+          </a:fontRef>
+        </p:style>
+        <p:txBody>
+          <a:bodyPr rtlCol="0" anchor="ctr"/>
+          <a:lstStyle/>
+          <a:p>
+            <a:pPr marL="0" marR="0" lvl="0" indent="0" algn="ctr" defTabSz="914400" rtl="0" eaLnBrk="1" fontAlgn="auto" latinLnBrk="0" hangingPunct="1">
+              <a:lnSpc>
+                <a:spcPct val="100000"/>
+              </a:lnSpc>
+              <a:spcBef>
+                <a:spcPts val="0"/>
+              </a:spcBef>
+              <a:spcAft>
+                <a:spcPts val="0"/>
+              </a:spcAft>
+              <a:buClrTx/>
+              <a:buSzTx/>
+              <a:buFontTx/>
+              <a:buNone/>
+              <a:tabLst/>
+              <a:defRPr/>
+            </a:pPr>
+            <a:endParaRPr kumimoji="0" lang="en-US" sz="1800" b="0" i="0" u="none" strike="noStrike" kern="1200" cap="none" spc="0" normalizeH="0" baseline="0" noProof="0">
+              <a:ln>
+                <a:noFill/>
+              </a:ln>
+              <a:solidFill>
+                <a:prstClr val="white"/>
+              </a:solidFill>
+              <a:effectLst/>
+              <a:uLnTx/>
+              <a:uFillTx/>
+              <a:latin typeface="Calibri" panose="020F0502020204030204"/>
+              <a:ea typeface="+mn-ea"/>
+              <a:cs typeface="+mn-cs"/>
+            </a:endParaRPr>
+          </a:p>
+        </p:txBody>
+      </p:sp>
+      <p:sp>
+        <p:nvSpPr>
+          <p:cNvPr id="2" name="Title 1">
+            <a:extLst>
+              <a:ext uri="{FF2B5EF4-FFF2-40B4-BE49-F238E27FC236}">
+                <a16:creationId xmlns:a16="http://schemas.microsoft.com/office/drawing/2014/main" id="{6B646C67-F099-427D-AE07-1B21234CC1B4}"/>
+              </a:ext>
+            </a:extLst>
+          </p:cNvPr>
+          <p:cNvSpPr>
+            <a:spLocks noGrp="1"/>
+          </p:cNvSpPr>
+          <p:nvPr>
+            <p:ph type="title"/>
+          </p:nvPr>
+        </p:nvSpPr>
+        <p:spPr>
+          <a:xfrm>
+            <a:off x="4657256" y="2916520"/>
+            <a:ext cx="6465287" cy="2309364"/>
+          </a:xfrm>
+        </p:spPr>
+        <p:txBody>
+          <a:bodyPr vert="horz" lIns="91440" tIns="45720" rIns="91440" bIns="45720" rtlCol="0" anchor="b">
+            <a:normAutofit/>
+          </a:bodyPr>
+          <a:lstStyle/>
+          <a:p>
+            <a:r>
+              <a:rPr lang="en-US" sz="4800" kern="1200">
+                <a:solidFill>
+                  <a:srgbClr val="FFFFFF"/>
+                </a:solidFill>
+                <a:latin typeface="+mj-lt"/>
+                <a:ea typeface="+mj-ea"/>
+                <a:cs typeface="+mj-cs"/>
+              </a:rPr>
+              <a:t>Emerging Data Types</a:t>
+            </a:r>
+          </a:p>
+        </p:txBody>
+      </p:sp>
+      <p:cxnSp>
+        <p:nvCxnSpPr>
+          <p:cNvPr id="20" name="Straight Connector 19">
+            <a:extLst>
+              <a:ext uri="{FF2B5EF4-FFF2-40B4-BE49-F238E27FC236}">
+                <a16:creationId xmlns:a16="http://schemas.microsoft.com/office/drawing/2014/main" id="{982DC870-E8E5-4050-B10C-CC24FC67E50A}"/>
+              </a:ext>
+              <a:ext uri="{C183D7F6-B498-43B3-948B-1728B52AA6E4}">
+                <adec:decorative xmlns:adec="http://schemas.microsoft.com/office/drawing/2017/decorative" val="1"/>
+              </a:ext>
+            </a:extLst>
+          </p:cNvPr>
+          <p:cNvCxnSpPr>
+            <a:cxnSpLocks noGrp="1" noRot="1" noChangeAspect="1" noMove="1" noResize="1" noEditPoints="1" noAdjustHandles="1" noChangeArrowheads="1" noChangeShapeType="1"/>
+          </p:cNvCxnSpPr>
+          <p:nvPr>
+            <p:extLst>
+              <p:ext uri="{386F3935-93C4-4BCD-93E2-E3B085C9AB24}">
+                <p16:designElem xmlns:p16="http://schemas.microsoft.com/office/powerpoint/2015/main" val="1"/>
+              </p:ext>
+            </p:extLst>
+          </p:nvPr>
+        </p:nvCxnSpPr>
+        <p:spPr>
+          <a:xfrm flipH="1">
+            <a:off x="0" y="2285774"/>
+            <a:ext cx="12188952" cy="0"/>
+          </a:xfrm>
+          <a:prstGeom prst="line">
+            <a:avLst/>
+          </a:prstGeom>
+          <a:ln w="101600">
+            <a:solidFill>
+              <a:srgbClr val="404040"/>
+            </a:solidFill>
+          </a:ln>
+        </p:spPr>
+        <p:style>
+          <a:lnRef idx="1">
+            <a:schemeClr val="accent1"/>
+          </a:lnRef>
+          <a:fillRef idx="0">
+            <a:schemeClr val="accent1"/>
+          </a:fillRef>
+          <a:effectRef idx="0">
+            <a:schemeClr val="accent1"/>
+          </a:effectRef>
+          <a:fontRef idx="minor">
+            <a:schemeClr val="tx1"/>
+          </a:fontRef>
+        </p:style>
+      </p:cxnSp>
+      <p:cxnSp>
+        <p:nvCxnSpPr>
+          <p:cNvPr id="22" name="Straight Connector 21">
+            <a:extLst>
+              <a:ext uri="{FF2B5EF4-FFF2-40B4-BE49-F238E27FC236}">
+                <a16:creationId xmlns:a16="http://schemas.microsoft.com/office/drawing/2014/main" id="{FF76A74F-C283-4DED-BD4D-086753B7CB00}"/>
+              </a:ext>
+              <a:ext uri="{C183D7F6-B498-43B3-948B-1728B52AA6E4}">
+                <adec:decorative xmlns:adec="http://schemas.microsoft.com/office/drawing/2017/decorative" val="1"/>
+              </a:ext>
+            </a:extLst>
+          </p:cNvPr>
+          <p:cNvCxnSpPr>
+            <a:cxnSpLocks noGrp="1" noRot="1" noChangeAspect="1" noMove="1" noResize="1" noEditPoints="1" noAdjustHandles="1" noChangeArrowheads="1" noChangeShapeType="1"/>
+          </p:cNvCxnSpPr>
+          <p:nvPr>
+            <p:extLst>
+              <p:ext uri="{386F3935-93C4-4BCD-93E2-E3B085C9AB24}">
+                <p16:designElem xmlns:p16="http://schemas.microsoft.com/office/powerpoint/2015/main" val="1"/>
+              </p:ext>
+            </p:extLst>
+          </p:nvPr>
+        </p:nvCxnSpPr>
+        <p:spPr>
+          <a:xfrm flipH="1">
+            <a:off x="0" y="4571548"/>
+            <a:ext cx="4064320" cy="0"/>
+          </a:xfrm>
+          <a:prstGeom prst="line">
+            <a:avLst/>
+          </a:prstGeom>
+          <a:ln w="101600">
+            <a:solidFill>
+              <a:srgbClr val="404040"/>
+            </a:solidFill>
+          </a:ln>
+        </p:spPr>
+        <p:style>
+          <a:lnRef idx="1">
+            <a:schemeClr val="accent1"/>
+          </a:lnRef>
+          <a:fillRef idx="0">
+            <a:schemeClr val="accent1"/>
+          </a:fillRef>
+          <a:effectRef idx="0">
+            <a:schemeClr val="accent1"/>
+          </a:effectRef>
+          <a:fontRef idx="minor">
+            <a:schemeClr val="tx1"/>
+          </a:fontRef>
+        </p:style>
+      </p:cxnSp>
+      <p:cxnSp>
+        <p:nvCxnSpPr>
+          <p:cNvPr id="24" name="Straight Connector 23">
+            <a:extLst>
+              <a:ext uri="{FF2B5EF4-FFF2-40B4-BE49-F238E27FC236}">
+                <a16:creationId xmlns:a16="http://schemas.microsoft.com/office/drawing/2014/main" id="{3B2791FB-B2F7-4BBE-B8D8-74C37FF9E85C}"/>
+              </a:ext>
+              <a:ext uri="{C183D7F6-B498-43B3-948B-1728B52AA6E4}">
+                <adec:decorative xmlns:adec="http://schemas.microsoft.com/office/drawing/2017/decorative" val="1"/>
+              </a:ext>
+            </a:extLst>
+          </p:cNvPr>
+          <p:cNvCxnSpPr>
+            <a:cxnSpLocks noGrp="1" noRot="1" noChangeAspect="1" noMove="1" noResize="1" noEditPoints="1" noAdjustHandles="1" noChangeArrowheads="1" noChangeShapeType="1"/>
+          </p:cNvCxnSpPr>
+          <p:nvPr>
+            <p:extLst>
+              <p:ext uri="{386F3935-93C4-4BCD-93E2-E3B085C9AB24}">
+                <p16:designElem xmlns:p16="http://schemas.microsoft.com/office/powerpoint/2015/main" val="1"/>
+              </p:ext>
+            </p:extLst>
+          </p:nvPr>
+        </p:nvCxnSpPr>
+        <p:spPr>
+          <a:xfrm>
+            <a:off x="4064319" y="-680"/>
+            <a:ext cx="0" cy="6858003"/>
+          </a:xfrm>
+          <a:prstGeom prst="line">
+            <a:avLst/>
+          </a:prstGeom>
+          <a:ln w="101600">
+            <a:solidFill>
+              <a:srgbClr val="404040"/>
+            </a:solidFill>
+          </a:ln>
+        </p:spPr>
+        <p:style>
+          <a:lnRef idx="1">
+            <a:schemeClr val="accent1"/>
+          </a:lnRef>
+          <a:fillRef idx="0">
+            <a:schemeClr val="accent1"/>
+          </a:fillRef>
+          <a:effectRef idx="0">
+            <a:schemeClr val="accent1"/>
+          </a:effectRef>
+          <a:fontRef idx="minor">
+            <a:schemeClr val="tx1"/>
+          </a:fontRef>
+        </p:style>
+      </p:cxnSp>
+      <p:cxnSp>
+        <p:nvCxnSpPr>
+          <p:cNvPr id="26" name="Straight Connector 25">
+            <a:extLst>
+              <a:ext uri="{FF2B5EF4-FFF2-40B4-BE49-F238E27FC236}">
+                <a16:creationId xmlns:a16="http://schemas.microsoft.com/office/drawing/2014/main" id="{9891B5DE-6811-4844-BB18-472A3F360EE5}"/>
+              </a:ext>
+              <a:ext uri="{C183D7F6-B498-43B3-948B-1728B52AA6E4}">
+                <adec:decorative xmlns:adec="http://schemas.microsoft.com/office/drawing/2017/decorative" val="1"/>
+              </a:ext>
+            </a:extLst>
+          </p:cNvPr>
+          <p:cNvCxnSpPr>
+            <a:cxnSpLocks noGrp="1" noRot="1" noChangeAspect="1" noMove="1" noResize="1" noEditPoints="1" noAdjustHandles="1" noChangeArrowheads="1" noChangeShapeType="1"/>
+          </p:cNvCxnSpPr>
+          <p:nvPr>
+            <p:extLst>
+              <p:ext uri="{386F3935-93C4-4BCD-93E2-E3B085C9AB24}">
+                <p16:designElem xmlns:p16="http://schemas.microsoft.com/office/powerpoint/2015/main" val="1"/>
+              </p:ext>
+            </p:extLst>
+          </p:nvPr>
+        </p:nvCxnSpPr>
+        <p:spPr>
+          <a:xfrm>
+            <a:off x="8020742" y="-680"/>
+            <a:ext cx="0" cy="2240280"/>
+          </a:xfrm>
+          <a:prstGeom prst="line">
+            <a:avLst/>
+          </a:prstGeom>
+          <a:ln w="101600">
+            <a:solidFill>
+              <a:srgbClr val="404040"/>
+            </a:solidFill>
+          </a:ln>
+        </p:spPr>
+        <p:style>
+          <a:lnRef idx="1">
+            <a:schemeClr val="accent1"/>
+          </a:lnRef>
+          <a:fillRef idx="0">
+            <a:schemeClr val="accent1"/>
+          </a:fillRef>
+          <a:effectRef idx="0">
+            <a:schemeClr val="accent1"/>
+          </a:effectRef>
+          <a:fontRef idx="minor">
+            <a:schemeClr val="tx1"/>
+          </a:fontRef>
+        </p:style>
+      </p:cxnSp>
+      <p:cxnSp>
+        <p:nvCxnSpPr>
+          <p:cNvPr id="28" name="Straight Connector 27">
+            <a:extLst>
+              <a:ext uri="{FF2B5EF4-FFF2-40B4-BE49-F238E27FC236}">
+                <a16:creationId xmlns:a16="http://schemas.microsoft.com/office/drawing/2014/main" id="{77A9CA3A-7216-41E0-B3CD-058077FD396D}"/>
+              </a:ext>
+              <a:ext uri="{C183D7F6-B498-43B3-948B-1728B52AA6E4}">
+                <adec:decorative xmlns:adec="http://schemas.microsoft.com/office/drawing/2017/decorative" val="1"/>
+              </a:ext>
+            </a:extLst>
+          </p:cNvPr>
+          <p:cNvCxnSpPr>
+            <a:cxnSpLocks noGrp="1" noRot="1" noChangeAspect="1" noMove="1" noResize="1" noEditPoints="1" noAdjustHandles="1" noChangeArrowheads="1" noChangeShapeType="1"/>
+          </p:cNvCxnSpPr>
+          <p:nvPr>
+            <p:extLst>
+              <p:ext uri="{386F3935-93C4-4BCD-93E2-E3B085C9AB24}">
+                <p16:designElem xmlns:p16="http://schemas.microsoft.com/office/powerpoint/2015/main" val="1"/>
+              </p:ext>
+            </p:extLst>
+          </p:nvPr>
+        </p:nvCxnSpPr>
+        <p:spPr>
+          <a:xfrm>
+            <a:off x="4746931" y="5336249"/>
+            <a:ext cx="5486400" cy="0"/>
+          </a:xfrm>
+          <a:prstGeom prst="line">
+            <a:avLst/>
+          </a:prstGeom>
+          <a:ln w="15875">
+            <a:solidFill>
+              <a:srgbClr val="FFFFFF">
+                <a:alpha val="75000"/>
+              </a:srgbClr>
+            </a:solidFill>
+          </a:ln>
+        </p:spPr>
+        <p:style>
+          <a:lnRef idx="1">
+            <a:schemeClr val="accent1"/>
+          </a:lnRef>
+          <a:fillRef idx="0">
+            <a:schemeClr val="accent1"/>
+          </a:fillRef>
+          <a:effectRef idx="0">
+            <a:schemeClr val="accent1"/>
+          </a:effectRef>
+          <a:fontRef idx="minor">
+            <a:schemeClr val="tx1"/>
+          </a:fontRef>
+        </p:style>
+      </p:cxnSp>
+      <p:sp>
+        <p:nvSpPr>
+          <p:cNvPr id="14" name="TextBox 13">
+            <a:extLst>
+              <a:ext uri="{FF2B5EF4-FFF2-40B4-BE49-F238E27FC236}">
+                <a16:creationId xmlns:a16="http://schemas.microsoft.com/office/drawing/2014/main" id="{5308B85A-E685-443C-9B1C-83CF6C1936C3}"/>
+              </a:ext>
+            </a:extLst>
+          </p:cNvPr>
+          <p:cNvSpPr txBox="1"/>
+          <p:nvPr/>
+        </p:nvSpPr>
+        <p:spPr>
+          <a:xfrm>
+            <a:off x="8585503" y="1798412"/>
+            <a:ext cx="3030701" cy="369332"/>
+          </a:xfrm>
+          <a:prstGeom prst="rect">
+            <a:avLst/>
+          </a:prstGeom>
+          <a:noFill/>
+        </p:spPr>
+        <p:txBody>
+          <a:bodyPr wrap="none" rtlCol="0">
+            <a:spAutoFit/>
+          </a:bodyPr>
+          <a:lstStyle/>
+          <a:p>
+            <a:r>
+              <a:rPr lang="en-US" dirty="0" err="1"/>
+              <a:t>Diarisation</a:t>
+            </a:r>
+            <a:r>
+              <a:rPr lang="en-US" dirty="0"/>
+              <a:t> and voice forensics</a:t>
+            </a:r>
+          </a:p>
+        </p:txBody>
+      </p:sp>
+      <p:sp>
+        <p:nvSpPr>
+          <p:cNvPr id="21" name="TextBox 20">
+            <a:extLst>
+              <a:ext uri="{FF2B5EF4-FFF2-40B4-BE49-F238E27FC236}">
+                <a16:creationId xmlns:a16="http://schemas.microsoft.com/office/drawing/2014/main" id="{221B001D-857F-4DBE-9FCC-E9835ECCB4D1}"/>
+              </a:ext>
+            </a:extLst>
+          </p:cNvPr>
+          <p:cNvSpPr txBox="1"/>
+          <p:nvPr/>
+        </p:nvSpPr>
+        <p:spPr>
+          <a:xfrm>
+            <a:off x="5645682" y="1782923"/>
+            <a:ext cx="728084" cy="369332"/>
+          </a:xfrm>
+          <a:prstGeom prst="rect">
+            <a:avLst/>
+          </a:prstGeom>
+          <a:noFill/>
+        </p:spPr>
+        <p:txBody>
+          <a:bodyPr wrap="none" rtlCol="0">
+            <a:spAutoFit/>
+          </a:bodyPr>
+          <a:lstStyle/>
+          <a:p>
+            <a:r>
+              <a:rPr lang="en-US" dirty="0"/>
+              <a:t>Video</a:t>
+            </a:r>
+          </a:p>
+        </p:txBody>
+      </p:sp>
+      <p:sp>
+        <p:nvSpPr>
+          <p:cNvPr id="23" name="TextBox 22">
+            <a:extLst>
+              <a:ext uri="{FF2B5EF4-FFF2-40B4-BE49-F238E27FC236}">
+                <a16:creationId xmlns:a16="http://schemas.microsoft.com/office/drawing/2014/main" id="{C6CC63C3-568E-421E-835A-CF644F7683F9}"/>
+              </a:ext>
+            </a:extLst>
+          </p:cNvPr>
+          <p:cNvSpPr txBox="1"/>
+          <p:nvPr/>
+        </p:nvSpPr>
+        <p:spPr>
+          <a:xfrm>
+            <a:off x="1613795" y="1798412"/>
+            <a:ext cx="736099" cy="369332"/>
+          </a:xfrm>
+          <a:prstGeom prst="rect">
+            <a:avLst/>
+          </a:prstGeom>
+          <a:noFill/>
+        </p:spPr>
+        <p:txBody>
+          <a:bodyPr wrap="none" rtlCol="0">
+            <a:spAutoFit/>
+          </a:bodyPr>
+          <a:lstStyle/>
+          <a:p>
+            <a:r>
+              <a:rPr lang="en-US" dirty="0"/>
+              <a:t>Audio</a:t>
+            </a:r>
+          </a:p>
+        </p:txBody>
+      </p:sp>
+      <p:sp>
+        <p:nvSpPr>
+          <p:cNvPr id="25" name="TextBox 24">
+            <a:extLst>
+              <a:ext uri="{FF2B5EF4-FFF2-40B4-BE49-F238E27FC236}">
+                <a16:creationId xmlns:a16="http://schemas.microsoft.com/office/drawing/2014/main" id="{7375D42C-488E-49AE-B925-AF0B83DA9864}"/>
+              </a:ext>
+            </a:extLst>
+          </p:cNvPr>
+          <p:cNvSpPr txBox="1"/>
+          <p:nvPr/>
+        </p:nvSpPr>
+        <p:spPr>
+          <a:xfrm>
+            <a:off x="1237684" y="4092726"/>
+            <a:ext cx="1606594" cy="369332"/>
+          </a:xfrm>
+          <a:prstGeom prst="rect">
+            <a:avLst/>
+          </a:prstGeom>
+          <a:noFill/>
+        </p:spPr>
+        <p:txBody>
+          <a:bodyPr wrap="none" rtlCol="0">
+            <a:spAutoFit/>
+          </a:bodyPr>
+          <a:lstStyle/>
+          <a:p>
+            <a:r>
+              <a:rPr lang="en-US" dirty="0"/>
+              <a:t>Streaming data</a:t>
+            </a:r>
+          </a:p>
+        </p:txBody>
+      </p:sp>
+    </p:spTree>
+    <p:extLst>
+      <p:ext uri="{BB962C8B-B14F-4D97-AF65-F5344CB8AC3E}">
+        <p14:creationId xmlns:p14="http://schemas.microsoft.com/office/powerpoint/2010/main" val="2144192018"/>
+      </p:ext>
+    </p:extLst>
+  </p:cSld>
+  <p:clrMapOvr>
+    <a:masterClrMapping/>
+  </p:clrMapOvr>
+</p:sld>
+</file>
+
+<file path=ppt/slides/slide8.xml><?xml version="1.0" encoding="utf-8"?>
+<p:sld xmlns:a="http://schemas.openxmlformats.org/drawingml/2006/main" xmlns:r="http://schemas.openxmlformats.org/officeDocument/2006/relationships" xmlns:p="http://schemas.openxmlformats.org/presentationml/2006/main">
+  <p:cSld>
+    <p:bg>
+      <p:bgPr>
+        <a:solidFill>
           <a:schemeClr val="bg1">
             <a:tint val="95000"/>
             <a:satMod val="170000"/>
@@ -10723,7 +11917,7 @@
 </p:sld>
 </file>
 
-<file path=ppt/slides/slide8.xml><?xml version="1.0" encoding="utf-8"?>
+<file path=ppt/slides/slide9.xml><?xml version="1.0" encoding="utf-8"?>
 <p:sld xmlns:a="http://schemas.openxmlformats.org/drawingml/2006/main" xmlns:r="http://schemas.openxmlformats.org/officeDocument/2006/relationships" xmlns:p="http://schemas.openxmlformats.org/presentationml/2006/main">
   <p:cSld>
     <p:bg>
@@ -11149,260 +12343,6 @@
   </p:cSld>
   <p:clrMapOvr>
     <a:overrideClrMapping bg1="dk1" tx1="lt1" bg2="dk2" tx2="lt2" accent1="accent1" accent2="accent2" accent3="accent3" accent4="accent4" accent5="accent5" accent6="accent6" hlink="hlink" folHlink="folHlink"/>
-  </p:clrMapOvr>
-</p:sld>
-</file>
-
-<file path=ppt/slides/slide9.xml><?xml version="1.0" encoding="utf-8"?>
-<p:sld xmlns:a="http://schemas.openxmlformats.org/drawingml/2006/main" xmlns:r="http://schemas.openxmlformats.org/officeDocument/2006/relationships" xmlns:p="http://schemas.openxmlformats.org/presentationml/2006/main">
-  <p:cSld>
-    <p:bg>
-      <p:bgPr>
-        <a:solidFill>
-          <a:schemeClr val="bg1"/>
-        </a:solidFill>
-        <a:effectLst/>
-      </p:bgPr>
-    </p:bg>
-    <p:spTree>
-      <p:nvGrpSpPr>
-        <p:cNvPr id="1" name=""/>
-        <p:cNvGrpSpPr/>
-        <p:nvPr/>
-      </p:nvGrpSpPr>
-      <p:grpSpPr>
-        <a:xfrm>
-          <a:off x="0" y="0"/>
-          <a:ext cx="0" cy="0"/>
-          <a:chOff x="0" y="0"/>
-          <a:chExt cx="0" cy="0"/>
-        </a:xfrm>
-      </p:grpSpPr>
-      <p:sp>
-        <p:nvSpPr>
-          <p:cNvPr id="10" name="Rectangle 9">
-            <a:extLst>
-              <a:ext uri="{FF2B5EF4-FFF2-40B4-BE49-F238E27FC236}">
-                <a16:creationId xmlns:a16="http://schemas.microsoft.com/office/drawing/2014/main" id="{6753252F-4873-4F63-801D-CC719279A7D5}"/>
-              </a:ext>
-              <a:ext uri="{C183D7F6-B498-43B3-948B-1728B52AA6E4}">
-                <adec:decorative xmlns:adec="http://schemas.microsoft.com/office/drawing/2017/decorative" val="1"/>
-              </a:ext>
-            </a:extLst>
-          </p:cNvPr>
-          <p:cNvSpPr>
-            <a:spLocks noGrp="1" noRot="1" noChangeAspect="1" noMove="1" noResize="1" noEditPoints="1" noAdjustHandles="1" noChangeArrowheads="1" noChangeShapeType="1" noTextEdit="1"/>
-          </p:cNvSpPr>
-          <p:nvPr>
-            <p:extLst>
-              <p:ext uri="{386F3935-93C4-4BCD-93E2-E3B085C9AB24}">
-                <p16:designElem xmlns:p16="http://schemas.microsoft.com/office/powerpoint/2015/main" val="1"/>
-              </p:ext>
-            </p:extLst>
-          </p:nvPr>
-        </p:nvSpPr>
-        <p:spPr>
-          <a:xfrm>
-            <a:off x="0" y="0"/>
-            <a:ext cx="12192000" cy="6858000"/>
-          </a:xfrm>
-          <a:prstGeom prst="rect">
-            <a:avLst/>
-          </a:prstGeom>
-          <a:solidFill>
-            <a:srgbClr val="FFFFFF"/>
-          </a:solidFill>
-          <a:ln>
-            <a:noFill/>
-          </a:ln>
-        </p:spPr>
-        <p:style>
-          <a:lnRef idx="2">
-            <a:schemeClr val="accent1">
-              <a:shade val="50000"/>
-            </a:schemeClr>
-          </a:lnRef>
-          <a:fillRef idx="1">
-            <a:schemeClr val="accent1"/>
-          </a:fillRef>
-          <a:effectRef idx="0">
-            <a:schemeClr val="accent1"/>
-          </a:effectRef>
-          <a:fontRef idx="minor">
-            <a:schemeClr val="lt1"/>
-          </a:fontRef>
-        </p:style>
-        <p:txBody>
-          <a:bodyPr rtlCol="0" anchor="ctr"/>
-          <a:lstStyle/>
-          <a:p>
-            <a:pPr algn="ctr"/>
-            <a:endParaRPr lang="en-US"/>
-          </a:p>
-        </p:txBody>
-      </p:sp>
-      <p:sp>
-        <p:nvSpPr>
-          <p:cNvPr id="15" name="Rectangle 11">
-            <a:extLst>
-              <a:ext uri="{FF2B5EF4-FFF2-40B4-BE49-F238E27FC236}">
-                <a16:creationId xmlns:a16="http://schemas.microsoft.com/office/drawing/2014/main" id="{047C8CCB-F95D-4249-92DD-651249D3535A}"/>
-              </a:ext>
-              <a:ext uri="{C183D7F6-B498-43B3-948B-1728B52AA6E4}">
-                <adec:decorative xmlns:adec="http://schemas.microsoft.com/office/drawing/2017/decorative" val="1"/>
-              </a:ext>
-            </a:extLst>
-          </p:cNvPr>
-          <p:cNvSpPr>
-            <a:spLocks noGrp="1" noRot="1" noChangeAspect="1" noMove="1" noResize="1" noEditPoints="1" noAdjustHandles="1" noChangeArrowheads="1" noChangeShapeType="1" noTextEdit="1"/>
-          </p:cNvSpPr>
-          <p:nvPr>
-            <p:extLst>
-              <p:ext uri="{386F3935-93C4-4BCD-93E2-E3B085C9AB24}">
-                <p16:designElem xmlns:p16="http://schemas.microsoft.com/office/powerpoint/2015/main" val="1"/>
-              </p:ext>
-            </p:extLst>
-          </p:nvPr>
-        </p:nvSpPr>
-        <p:spPr>
-          <a:xfrm>
-            <a:off x="0" y="0"/>
-            <a:ext cx="2013557" cy="6858000"/>
-          </a:xfrm>
-          <a:prstGeom prst="rect">
-            <a:avLst/>
-          </a:prstGeom>
-          <a:solidFill>
-            <a:srgbClr val="435D7B"/>
-          </a:solidFill>
-          <a:ln>
-            <a:noFill/>
-          </a:ln>
-        </p:spPr>
-        <p:style>
-          <a:lnRef idx="2">
-            <a:schemeClr val="accent1">
-              <a:shade val="50000"/>
-            </a:schemeClr>
-          </a:lnRef>
-          <a:fillRef idx="1">
-            <a:schemeClr val="accent1"/>
-          </a:fillRef>
-          <a:effectRef idx="0">
-            <a:schemeClr val="accent1"/>
-          </a:effectRef>
-          <a:fontRef idx="minor">
-            <a:schemeClr val="lt1"/>
-          </a:fontRef>
-        </p:style>
-        <p:txBody>
-          <a:bodyPr rtlCol="0" anchor="ctr"/>
-          <a:lstStyle/>
-          <a:p>
-            <a:pPr algn="ctr"/>
-            <a:endParaRPr lang="en-US"/>
-          </a:p>
-        </p:txBody>
-      </p:sp>
-      <p:pic>
-        <p:nvPicPr>
-          <p:cNvPr id="5" name="Picture 4" descr="A close up of a sign&#10;&#10;Description automatically generated">
-            <a:extLst>
-              <a:ext uri="{FF2B5EF4-FFF2-40B4-BE49-F238E27FC236}">
-                <a16:creationId xmlns:a16="http://schemas.microsoft.com/office/drawing/2014/main" id="{F947E86C-78B3-4201-971E-8DBC568110F1}"/>
-              </a:ext>
-            </a:extLst>
-          </p:cNvPr>
-          <p:cNvPicPr>
-            <a:picLocks noChangeAspect="1"/>
-          </p:cNvPicPr>
-          <p:nvPr/>
-        </p:nvPicPr>
-        <p:blipFill>
-          <a:blip r:embed="rId2">
-            <a:extLst>
-              <a:ext uri="{28A0092B-C50C-407E-A947-70E740481C1C}">
-                <a14:useLocalDpi xmlns:a14="http://schemas.microsoft.com/office/drawing/2010/main" val="0"/>
-              </a:ext>
-            </a:extLst>
-          </a:blip>
-          <a:stretch>
-            <a:fillRect/>
-          </a:stretch>
-        </p:blipFill>
-        <p:spPr>
-          <a:xfrm>
-            <a:off x="3058511" y="258862"/>
-            <a:ext cx="7677806" cy="6340275"/>
-          </a:xfrm>
-          <a:prstGeom prst="rect">
-            <a:avLst/>
-          </a:prstGeom>
-        </p:spPr>
-      </p:pic>
-      <p:sp>
-        <p:nvSpPr>
-          <p:cNvPr id="2" name="Title 1">
-            <a:extLst>
-              <a:ext uri="{FF2B5EF4-FFF2-40B4-BE49-F238E27FC236}">
-                <a16:creationId xmlns:a16="http://schemas.microsoft.com/office/drawing/2014/main" id="{9EB47BE4-BD7C-4F3D-B3B2-4C772A90373B}"/>
-              </a:ext>
-            </a:extLst>
-          </p:cNvPr>
-          <p:cNvSpPr>
-            <a:spLocks noGrp="1"/>
-          </p:cNvSpPr>
-          <p:nvPr>
-            <p:ph type="title"/>
-          </p:nvPr>
-        </p:nvSpPr>
-        <p:spPr>
-          <a:xfrm>
-            <a:off x="640080" y="2074363"/>
-            <a:ext cx="2752354" cy="2709275"/>
-          </a:xfrm>
-          <a:prstGeom prst="ellipse">
-            <a:avLst/>
-          </a:prstGeom>
-          <a:solidFill>
-            <a:srgbClr val="262626"/>
-          </a:solidFill>
-          <a:ln w="174625" cmpd="thinThick">
-            <a:solidFill>
-              <a:srgbClr val="262626"/>
-            </a:solidFill>
-          </a:ln>
-        </p:spPr>
-        <p:txBody>
-          <a:bodyPr vert="horz" lIns="91440" tIns="45720" rIns="91440" bIns="45720" rtlCol="0" anchor="ctr">
-            <a:normAutofit/>
-          </a:bodyPr>
-          <a:lstStyle/>
-          <a:p>
-            <a:pPr algn="ctr"/>
-            <a:r>
-              <a:rPr lang="en-US" sz="2600" kern="1200">
-                <a:solidFill>
-                  <a:srgbClr val="FFFFFF"/>
-                </a:solidFill>
-                <a:latin typeface="+mj-lt"/>
-                <a:ea typeface="+mj-ea"/>
-                <a:cs typeface="+mj-cs"/>
-              </a:rPr>
-              <a:t>Scenario based discussion</a:t>
-            </a:r>
-          </a:p>
-        </p:txBody>
-      </p:sp>
-    </p:spTree>
-    <p:extLst>
-      <p:ext uri="{BB962C8B-B14F-4D97-AF65-F5344CB8AC3E}">
-        <p14:creationId xmlns:p14="http://schemas.microsoft.com/office/powerpoint/2010/main" val="2364114090"/>
-      </p:ext>
-    </p:extLst>
-  </p:cSld>
-  <p:clrMapOvr>
-    <a:masterClrMapping/>
   </p:clrMapOvr>
 </p:sld>
 </file>

</xml_diff>